<commit_message>
1. changed docs to match the redesign of the gui (buttons and LEDs) 2. added testcode in ipc_ARM.c for the PR
</commit_message>
<xml_diff>
--- a/docs/source/software/gui/images_javascope/addvariable.pptx
+++ b/docs/source/software/gui/images_javascope/addvariable.pptx
@@ -6,6 +6,8 @@
   </p:sldMasterIdLst>
   <p:sldIdLst>
     <p:sldId id="256" r:id="rId2"/>
+    <p:sldId id="257" r:id="rId3"/>
+    <p:sldId id="258" r:id="rId4"/>
   </p:sldIdLst>
   <p:sldSz cx="12192000" cy="6858000"/>
   <p:notesSz cx="6858000" cy="9144000"/>
@@ -104,6 +106,11 @@
       </a:defRPr>
     </a:lvl9pPr>
   </p:defaultTextStyle>
+  <p:extLst>
+    <p:ext uri="{EFAFB233-063F-42B5-8137-9DF3F51BA10A}">
+      <p15:sldGuideLst xmlns:p15="http://schemas.microsoft.com/office/powerpoint/2012/main"/>
+    </p:ext>
+  </p:extLst>
 </p:presentation>
 </file>
 
@@ -254,7 +261,7 @@
           <a:p>
             <a:fld id="{AD923909-A667-473E-AB8E-3A2572AEE804}" type="datetimeFigureOut">
               <a:rPr lang="de-DE" smtClean="0"/>
-              <a:t>18.01.2022</a:t>
+              <a:t>26.01.2022</a:t>
             </a:fld>
             <a:endParaRPr lang="de-DE"/>
           </a:p>
@@ -452,7 +459,7 @@
           <a:p>
             <a:fld id="{AD923909-A667-473E-AB8E-3A2572AEE804}" type="datetimeFigureOut">
               <a:rPr lang="de-DE" smtClean="0"/>
-              <a:t>18.01.2022</a:t>
+              <a:t>26.01.2022</a:t>
             </a:fld>
             <a:endParaRPr lang="de-DE"/>
           </a:p>
@@ -660,7 +667,7 @@
           <a:p>
             <a:fld id="{AD923909-A667-473E-AB8E-3A2572AEE804}" type="datetimeFigureOut">
               <a:rPr lang="de-DE" smtClean="0"/>
-              <a:t>18.01.2022</a:t>
+              <a:t>26.01.2022</a:t>
             </a:fld>
             <a:endParaRPr lang="de-DE"/>
           </a:p>
@@ -858,7 +865,7 @@
           <a:p>
             <a:fld id="{AD923909-A667-473E-AB8E-3A2572AEE804}" type="datetimeFigureOut">
               <a:rPr lang="de-DE" smtClean="0"/>
-              <a:t>18.01.2022</a:t>
+              <a:t>26.01.2022</a:t>
             </a:fld>
             <a:endParaRPr lang="de-DE"/>
           </a:p>
@@ -1133,7 +1140,7 @@
           <a:p>
             <a:fld id="{AD923909-A667-473E-AB8E-3A2572AEE804}" type="datetimeFigureOut">
               <a:rPr lang="de-DE" smtClean="0"/>
-              <a:t>18.01.2022</a:t>
+              <a:t>26.01.2022</a:t>
             </a:fld>
             <a:endParaRPr lang="de-DE"/>
           </a:p>
@@ -1398,7 +1405,7 @@
           <a:p>
             <a:fld id="{AD923909-A667-473E-AB8E-3A2572AEE804}" type="datetimeFigureOut">
               <a:rPr lang="de-DE" smtClean="0"/>
-              <a:t>18.01.2022</a:t>
+              <a:t>26.01.2022</a:t>
             </a:fld>
             <a:endParaRPr lang="de-DE"/>
           </a:p>
@@ -1810,7 +1817,7 @@
           <a:p>
             <a:fld id="{AD923909-A667-473E-AB8E-3A2572AEE804}" type="datetimeFigureOut">
               <a:rPr lang="de-DE" smtClean="0"/>
-              <a:t>18.01.2022</a:t>
+              <a:t>26.01.2022</a:t>
             </a:fld>
             <a:endParaRPr lang="de-DE"/>
           </a:p>
@@ -1951,7 +1958,7 @@
           <a:p>
             <a:fld id="{AD923909-A667-473E-AB8E-3A2572AEE804}" type="datetimeFigureOut">
               <a:rPr lang="de-DE" smtClean="0"/>
-              <a:t>18.01.2022</a:t>
+              <a:t>26.01.2022</a:t>
             </a:fld>
             <a:endParaRPr lang="de-DE"/>
           </a:p>
@@ -2064,7 +2071,7 @@
           <a:p>
             <a:fld id="{AD923909-A667-473E-AB8E-3A2572AEE804}" type="datetimeFigureOut">
               <a:rPr lang="de-DE" smtClean="0"/>
-              <a:t>18.01.2022</a:t>
+              <a:t>26.01.2022</a:t>
             </a:fld>
             <a:endParaRPr lang="de-DE"/>
           </a:p>
@@ -2375,7 +2382,7 @@
           <a:p>
             <a:fld id="{AD923909-A667-473E-AB8E-3A2572AEE804}" type="datetimeFigureOut">
               <a:rPr lang="de-DE" smtClean="0"/>
-              <a:t>18.01.2022</a:t>
+              <a:t>26.01.2022</a:t>
             </a:fld>
             <a:endParaRPr lang="de-DE"/>
           </a:p>
@@ -2663,7 +2670,7 @@
           <a:p>
             <a:fld id="{AD923909-A667-473E-AB8E-3A2572AEE804}" type="datetimeFigureOut">
               <a:rPr lang="de-DE" smtClean="0"/>
-              <a:t>18.01.2022</a:t>
+              <a:t>26.01.2022</a:t>
             </a:fld>
             <a:endParaRPr lang="de-DE"/>
           </a:p>
@@ -2904,7 +2911,7 @@
           <a:p>
             <a:fld id="{AD923909-A667-473E-AB8E-3A2572AEE804}" type="datetimeFigureOut">
               <a:rPr lang="de-DE" smtClean="0"/>
-              <a:t>18.01.2022</a:t>
+              <a:t>26.01.2022</a:t>
             </a:fld>
             <a:endParaRPr lang="de-DE"/>
           </a:p>
@@ -3878,6 +3885,450 @@
 </p:sld>
 </file>
 
+<file path=ppt/slides/slide2.xml><?xml version="1.0" encoding="utf-8"?>
+<p:sld xmlns:a="http://schemas.openxmlformats.org/drawingml/2006/main" xmlns:r="http://schemas.openxmlformats.org/officeDocument/2006/relationships" xmlns:p="http://schemas.openxmlformats.org/presentationml/2006/main">
+  <p:cSld>
+    <p:spTree>
+      <p:nvGrpSpPr>
+        <p:cNvPr id="1" name=""/>
+        <p:cNvGrpSpPr/>
+        <p:nvPr/>
+      </p:nvGrpSpPr>
+      <p:grpSpPr>
+        <a:xfrm>
+          <a:off x="0" y="0"/>
+          <a:ext cx="0" cy="0"/>
+          <a:chOff x="0" y="0"/>
+          <a:chExt cx="0" cy="0"/>
+        </a:xfrm>
+      </p:grpSpPr>
+      <p:pic>
+        <p:nvPicPr>
+          <p:cNvPr id="5" name="Grafik 4">
+            <a:extLst>
+              <a:ext uri="{FF2B5EF4-FFF2-40B4-BE49-F238E27FC236}">
+                <a16:creationId xmlns:a16="http://schemas.microsoft.com/office/drawing/2014/main" id="{3E684E2C-E44F-44DA-A174-AC31A8C5C499}"/>
+              </a:ext>
+            </a:extLst>
+          </p:cNvPr>
+          <p:cNvPicPr>
+            <a:picLocks noChangeAspect="1"/>
+          </p:cNvPicPr>
+          <p:nvPr/>
+        </p:nvPicPr>
+        <p:blipFill>
+          <a:blip r:embed="rId2"/>
+          <a:stretch>
+            <a:fillRect/>
+          </a:stretch>
+        </p:blipFill>
+        <p:spPr>
+          <a:xfrm>
+            <a:off x="666944" y="305307"/>
+            <a:ext cx="2382255" cy="3600000"/>
+          </a:xfrm>
+          <a:prstGeom prst="rect">
+            <a:avLst/>
+          </a:prstGeom>
+        </p:spPr>
+      </p:pic>
+      <p:pic>
+        <p:nvPicPr>
+          <p:cNvPr id="7" name="Grafik 6">
+            <a:extLst>
+              <a:ext uri="{FF2B5EF4-FFF2-40B4-BE49-F238E27FC236}">
+                <a16:creationId xmlns:a16="http://schemas.microsoft.com/office/drawing/2014/main" id="{B1D8BB93-FB1E-4FF1-B606-2C71E74E4029}"/>
+              </a:ext>
+            </a:extLst>
+          </p:cNvPr>
+          <p:cNvPicPr>
+            <a:picLocks noChangeAspect="1"/>
+          </p:cNvPicPr>
+          <p:nvPr/>
+        </p:nvPicPr>
+        <p:blipFill>
+          <a:blip r:embed="rId3"/>
+          <a:stretch>
+            <a:fillRect/>
+          </a:stretch>
+        </p:blipFill>
+        <p:spPr>
+          <a:xfrm>
+            <a:off x="2924166" y="305307"/>
+            <a:ext cx="2448674" cy="3600000"/>
+          </a:xfrm>
+          <a:prstGeom prst="rect">
+            <a:avLst/>
+          </a:prstGeom>
+        </p:spPr>
+      </p:pic>
+    </p:spTree>
+    <p:extLst>
+      <p:ext uri="{BB962C8B-B14F-4D97-AF65-F5344CB8AC3E}">
+        <p14:creationId xmlns:p14="http://schemas.microsoft.com/office/powerpoint/2010/main" val="2020824720"/>
+      </p:ext>
+    </p:extLst>
+  </p:cSld>
+  <p:clrMapOvr>
+    <a:masterClrMapping/>
+  </p:clrMapOvr>
+</p:sld>
+</file>
+
+<file path=ppt/slides/slide3.xml><?xml version="1.0" encoding="utf-8"?>
+<p:sld xmlns:a="http://schemas.openxmlformats.org/drawingml/2006/main" xmlns:r="http://schemas.openxmlformats.org/officeDocument/2006/relationships" xmlns:p="http://schemas.openxmlformats.org/presentationml/2006/main">
+  <p:cSld>
+    <p:spTree>
+      <p:nvGrpSpPr>
+        <p:cNvPr id="1" name=""/>
+        <p:cNvGrpSpPr/>
+        <p:nvPr/>
+      </p:nvGrpSpPr>
+      <p:grpSpPr>
+        <a:xfrm>
+          <a:off x="0" y="0"/>
+          <a:ext cx="0" cy="0"/>
+          <a:chOff x="0" y="0"/>
+          <a:chExt cx="0" cy="0"/>
+        </a:xfrm>
+      </p:grpSpPr>
+      <p:pic>
+        <p:nvPicPr>
+          <p:cNvPr id="5" name="Grafik 4">
+            <a:extLst>
+              <a:ext uri="{FF2B5EF4-FFF2-40B4-BE49-F238E27FC236}">
+                <a16:creationId xmlns:a16="http://schemas.microsoft.com/office/drawing/2014/main" id="{B9A289DE-DCFF-45C2-9F17-8BB429419C97}"/>
+              </a:ext>
+            </a:extLst>
+          </p:cNvPr>
+          <p:cNvPicPr>
+            <a:picLocks noChangeAspect="1"/>
+          </p:cNvPicPr>
+          <p:nvPr/>
+        </p:nvPicPr>
+        <p:blipFill>
+          <a:blip r:embed="rId2"/>
+          <a:stretch>
+            <a:fillRect/>
+          </a:stretch>
+        </p:blipFill>
+        <p:spPr>
+          <a:xfrm>
+            <a:off x="4292457" y="383277"/>
+            <a:ext cx="3607085" cy="4856259"/>
+          </a:xfrm>
+          <a:prstGeom prst="rect">
+            <a:avLst/>
+          </a:prstGeom>
+        </p:spPr>
+      </p:pic>
+      <p:pic>
+        <p:nvPicPr>
+          <p:cNvPr id="7" name="Grafik 6">
+            <a:extLst>
+              <a:ext uri="{FF2B5EF4-FFF2-40B4-BE49-F238E27FC236}">
+                <a16:creationId xmlns:a16="http://schemas.microsoft.com/office/drawing/2014/main" id="{0C0AB0AA-4D42-4EED-A6F1-57E648A23047}"/>
+              </a:ext>
+            </a:extLst>
+          </p:cNvPr>
+          <p:cNvPicPr>
+            <a:picLocks noChangeAspect="1"/>
+          </p:cNvPicPr>
+          <p:nvPr/>
+        </p:nvPicPr>
+        <p:blipFill>
+          <a:blip r:embed="rId3"/>
+          <a:stretch>
+            <a:fillRect/>
+          </a:stretch>
+        </p:blipFill>
+        <p:spPr>
+          <a:xfrm>
+            <a:off x="8229728" y="472135"/>
+            <a:ext cx="2234482" cy="1440000"/>
+          </a:xfrm>
+          <a:prstGeom prst="rect">
+            <a:avLst/>
+          </a:prstGeom>
+        </p:spPr>
+      </p:pic>
+      <p:pic>
+        <p:nvPicPr>
+          <p:cNvPr id="9" name="Grafik 8">
+            <a:extLst>
+              <a:ext uri="{FF2B5EF4-FFF2-40B4-BE49-F238E27FC236}">
+                <a16:creationId xmlns:a16="http://schemas.microsoft.com/office/drawing/2014/main" id="{7B530458-899A-45C8-B519-9DB13DBB8D92}"/>
+              </a:ext>
+            </a:extLst>
+          </p:cNvPr>
+          <p:cNvPicPr>
+            <a:picLocks noChangeAspect="1"/>
+          </p:cNvPicPr>
+          <p:nvPr/>
+        </p:nvPicPr>
+        <p:blipFill>
+          <a:blip r:embed="rId4"/>
+          <a:stretch>
+            <a:fillRect/>
+          </a:stretch>
+        </p:blipFill>
+        <p:spPr>
+          <a:xfrm>
+            <a:off x="8229728" y="2348423"/>
+            <a:ext cx="2524169" cy="1440000"/>
+          </a:xfrm>
+          <a:prstGeom prst="rect">
+            <a:avLst/>
+          </a:prstGeom>
+        </p:spPr>
+      </p:pic>
+      <p:pic>
+        <p:nvPicPr>
+          <p:cNvPr id="11" name="Grafik 10">
+            <a:extLst>
+              <a:ext uri="{FF2B5EF4-FFF2-40B4-BE49-F238E27FC236}">
+                <a16:creationId xmlns:a16="http://schemas.microsoft.com/office/drawing/2014/main" id="{BF9621E7-3AFB-4CE6-A447-C4473A6EA858}"/>
+              </a:ext>
+            </a:extLst>
+          </p:cNvPr>
+          <p:cNvPicPr>
+            <a:picLocks noChangeAspect="1"/>
+          </p:cNvPicPr>
+          <p:nvPr/>
+        </p:nvPicPr>
+        <p:blipFill>
+          <a:blip r:embed="rId5"/>
+          <a:stretch>
+            <a:fillRect/>
+          </a:stretch>
+        </p:blipFill>
+        <p:spPr>
+          <a:xfrm>
+            <a:off x="1402918" y="472135"/>
+            <a:ext cx="2559353" cy="1440000"/>
+          </a:xfrm>
+          <a:prstGeom prst="rect">
+            <a:avLst/>
+          </a:prstGeom>
+        </p:spPr>
+      </p:pic>
+      <p:pic>
+        <p:nvPicPr>
+          <p:cNvPr id="13" name="Grafik 12">
+            <a:extLst>
+              <a:ext uri="{FF2B5EF4-FFF2-40B4-BE49-F238E27FC236}">
+                <a16:creationId xmlns:a16="http://schemas.microsoft.com/office/drawing/2014/main" id="{0E4C4A0A-EABA-4A16-9A85-C08346B29AF8}"/>
+              </a:ext>
+            </a:extLst>
+          </p:cNvPr>
+          <p:cNvPicPr>
+            <a:picLocks noChangeAspect="1"/>
+          </p:cNvPicPr>
+          <p:nvPr/>
+        </p:nvPicPr>
+        <p:blipFill>
+          <a:blip r:embed="rId6"/>
+          <a:stretch>
+            <a:fillRect/>
+          </a:stretch>
+        </p:blipFill>
+        <p:spPr>
+          <a:xfrm>
+            <a:off x="1156435" y="2348423"/>
+            <a:ext cx="2805836" cy="1440000"/>
+          </a:xfrm>
+          <a:prstGeom prst="rect">
+            <a:avLst/>
+          </a:prstGeom>
+        </p:spPr>
+      </p:pic>
+      <p:cxnSp>
+        <p:nvCxnSpPr>
+          <p:cNvPr id="15" name="Gerade Verbindung mit Pfeil 14">
+            <a:extLst>
+              <a:ext uri="{FF2B5EF4-FFF2-40B4-BE49-F238E27FC236}">
+                <a16:creationId xmlns:a16="http://schemas.microsoft.com/office/drawing/2014/main" id="{099330C8-B7FE-4731-A762-0180DD61DFF6}"/>
+              </a:ext>
+            </a:extLst>
+          </p:cNvPr>
+          <p:cNvCxnSpPr/>
+          <p:nvPr/>
+        </p:nvCxnSpPr>
+        <p:spPr>
+          <a:xfrm>
+            <a:off x="3253409" y="742122"/>
+            <a:ext cx="1126434" cy="450013"/>
+          </a:xfrm>
+          <a:prstGeom prst="straightConnector1">
+            <a:avLst/>
+          </a:prstGeom>
+          <a:ln w="38100">
+            <a:solidFill>
+              <a:srgbClr val="FF0000"/>
+            </a:solidFill>
+            <a:tailEnd type="triangle"/>
+          </a:ln>
+        </p:spPr>
+        <p:style>
+          <a:lnRef idx="1">
+            <a:schemeClr val="accent1"/>
+          </a:lnRef>
+          <a:fillRef idx="0">
+            <a:schemeClr val="accent1"/>
+          </a:fillRef>
+          <a:effectRef idx="0">
+            <a:schemeClr val="accent1"/>
+          </a:effectRef>
+          <a:fontRef idx="minor">
+            <a:schemeClr val="tx1"/>
+          </a:fontRef>
+        </p:style>
+      </p:cxnSp>
+      <p:cxnSp>
+        <p:nvCxnSpPr>
+          <p:cNvPr id="16" name="Gerade Verbindung mit Pfeil 15">
+            <a:extLst>
+              <a:ext uri="{FF2B5EF4-FFF2-40B4-BE49-F238E27FC236}">
+                <a16:creationId xmlns:a16="http://schemas.microsoft.com/office/drawing/2014/main" id="{9322B900-11F8-481D-A0C6-36F181C7AFC0}"/>
+              </a:ext>
+            </a:extLst>
+          </p:cNvPr>
+          <p:cNvCxnSpPr>
+            <a:cxnSpLocks/>
+          </p:cNvCxnSpPr>
+          <p:nvPr/>
+        </p:nvCxnSpPr>
+        <p:spPr>
+          <a:xfrm flipV="1">
+            <a:off x="2135566" y="1380449"/>
+            <a:ext cx="3380331" cy="1256564"/>
+          </a:xfrm>
+          <a:prstGeom prst="straightConnector1">
+            <a:avLst/>
+          </a:prstGeom>
+          <a:ln w="38100">
+            <a:solidFill>
+              <a:srgbClr val="FF0000"/>
+            </a:solidFill>
+            <a:tailEnd type="triangle"/>
+          </a:ln>
+        </p:spPr>
+        <p:style>
+          <a:lnRef idx="1">
+            <a:schemeClr val="accent1"/>
+          </a:lnRef>
+          <a:fillRef idx="0">
+            <a:schemeClr val="accent1"/>
+          </a:fillRef>
+          <a:effectRef idx="0">
+            <a:schemeClr val="accent1"/>
+          </a:effectRef>
+          <a:fontRef idx="minor">
+            <a:schemeClr val="tx1"/>
+          </a:fontRef>
+        </p:style>
+      </p:cxnSp>
+      <p:cxnSp>
+        <p:nvCxnSpPr>
+          <p:cNvPr id="19" name="Gerade Verbindung mit Pfeil 18">
+            <a:extLst>
+              <a:ext uri="{FF2B5EF4-FFF2-40B4-BE49-F238E27FC236}">
+                <a16:creationId xmlns:a16="http://schemas.microsoft.com/office/drawing/2014/main" id="{C23D6946-DB50-4CFB-B0C9-493078E0E088}"/>
+              </a:ext>
+            </a:extLst>
+          </p:cNvPr>
+          <p:cNvCxnSpPr>
+            <a:cxnSpLocks/>
+          </p:cNvCxnSpPr>
+          <p:nvPr/>
+        </p:nvCxnSpPr>
+        <p:spPr>
+          <a:xfrm flipH="1" flipV="1">
+            <a:off x="7562973" y="1716713"/>
+            <a:ext cx="1321455" cy="1094693"/>
+          </a:xfrm>
+          <a:prstGeom prst="straightConnector1">
+            <a:avLst/>
+          </a:prstGeom>
+          <a:ln w="38100">
+            <a:solidFill>
+              <a:srgbClr val="FF0000"/>
+            </a:solidFill>
+            <a:tailEnd type="triangle"/>
+          </a:ln>
+        </p:spPr>
+        <p:style>
+          <a:lnRef idx="1">
+            <a:schemeClr val="accent1"/>
+          </a:lnRef>
+          <a:fillRef idx="0">
+            <a:schemeClr val="accent1"/>
+          </a:fillRef>
+          <a:effectRef idx="0">
+            <a:schemeClr val="accent1"/>
+          </a:effectRef>
+          <a:fontRef idx="minor">
+            <a:schemeClr val="tx1"/>
+          </a:fontRef>
+        </p:style>
+      </p:cxnSp>
+      <p:cxnSp>
+        <p:nvCxnSpPr>
+          <p:cNvPr id="22" name="Gerade Verbindung mit Pfeil 21">
+            <a:extLst>
+              <a:ext uri="{FF2B5EF4-FFF2-40B4-BE49-F238E27FC236}">
+                <a16:creationId xmlns:a16="http://schemas.microsoft.com/office/drawing/2014/main" id="{CF6A8046-C35B-47D5-AF7B-9DFEA25FE411}"/>
+              </a:ext>
+            </a:extLst>
+          </p:cNvPr>
+          <p:cNvCxnSpPr>
+            <a:cxnSpLocks/>
+          </p:cNvCxnSpPr>
+          <p:nvPr/>
+        </p:nvCxnSpPr>
+        <p:spPr>
+          <a:xfrm flipH="1">
+            <a:off x="6855051" y="825910"/>
+            <a:ext cx="2029377" cy="366225"/>
+          </a:xfrm>
+          <a:prstGeom prst="straightConnector1">
+            <a:avLst/>
+          </a:prstGeom>
+          <a:ln w="38100">
+            <a:solidFill>
+              <a:srgbClr val="FF0000"/>
+            </a:solidFill>
+            <a:tailEnd type="triangle"/>
+          </a:ln>
+        </p:spPr>
+        <p:style>
+          <a:lnRef idx="1">
+            <a:schemeClr val="accent1"/>
+          </a:lnRef>
+          <a:fillRef idx="0">
+            <a:schemeClr val="accent1"/>
+          </a:fillRef>
+          <a:effectRef idx="0">
+            <a:schemeClr val="accent1"/>
+          </a:effectRef>
+          <a:fontRef idx="minor">
+            <a:schemeClr val="tx1"/>
+          </a:fontRef>
+        </p:style>
+      </p:cxnSp>
+    </p:spTree>
+    <p:extLst>
+      <p:ext uri="{BB962C8B-B14F-4D97-AF65-F5344CB8AC3E}">
+        <p14:creationId xmlns:p14="http://schemas.microsoft.com/office/powerpoint/2010/main" val="741555400"/>
+      </p:ext>
+    </p:extLst>
+  </p:cSld>
+  <p:clrMapOvr>
+    <a:masterClrMapping/>
+  </p:clrMapOvr>
+</p:sld>
+</file>
+
 <file path=ppt/theme/theme1.xml><?xml version="1.0" encoding="utf-8"?>
 <a:theme xmlns:a="http://schemas.openxmlformats.org/drawingml/2006/main" name="Office">
   <a:themeElements>

</xml_diff>